<commit_message>
Atualização semestre ... 2023.2
</commit_message>
<xml_diff>
--- a/01 Classes/Aula01- BD.pptx
+++ b/01 Classes/Aula01- BD.pptx
@@ -302,7 +302,7 @@
       </p15:sldGuideLst>
     </p:ext>
     <p:ext uri="http://customooxmlschemas.google.com/">
-      <go:slidesCustomData xmlns:go="http://customooxmlschemas.google.com/" xmlns:ahyp="http://schemas.microsoft.com/office/drawing/2018/hyperlinkcolor" xmlns:p15="http://schemas.microsoft.com/office/powerpoint/2012/main" xmlns:p14="http://schemas.microsoft.com/office/powerpoint/2010/main" xmlns:com="http://schemas.openxmlformats.org/drawingml/2006/compatibility" xmlns:pvml="urn:schemas-microsoft-com:office:powerpoint" xmlns:v="urn:schemas-microsoft-com:vml" xmlns:o="urn:schemas-microsoft-com:office:office" xmlns:dgm="http://schemas.openxmlformats.org/drawingml/2006/diagram" xmlns:c="http://schemas.openxmlformats.org/drawingml/2006/chart" xmlns:mv="urn:schemas-microsoft-com:mac:vml" xmlns:mc="http://schemas.openxmlformats.org/markup-compatibility/2006" xmlns="" r:id="rId39" roundtripDataSignature="AMtx7mjlVzqr2hj2OPD0D5+Q594jPyUHlA=="/>
+      <go:slidesCustomData xmlns="" xmlns:mc="http://schemas.openxmlformats.org/markup-compatibility/2006" xmlns:mv="urn:schemas-microsoft-com:mac:vml" xmlns:c="http://schemas.openxmlformats.org/drawingml/2006/chart" xmlns:dgm="http://schemas.openxmlformats.org/drawingml/2006/diagram" xmlns:o="urn:schemas-microsoft-com:office:office" xmlns:v="urn:schemas-microsoft-com:vml" xmlns:pvml="urn:schemas-microsoft-com:office:powerpoint" xmlns:com="http://schemas.openxmlformats.org/drawingml/2006/compatibility" xmlns:p14="http://schemas.microsoft.com/office/powerpoint/2010/main" xmlns:p15="http://schemas.microsoft.com/office/powerpoint/2012/main" xmlns:ahyp="http://schemas.microsoft.com/office/drawing/2018/hyperlinkcolor" xmlns:go="http://customooxmlschemas.google.com/" r:id="rId39" roundtripDataSignature="AMtx7mjlVzqr2hj2OPD0D5+Q594jPyUHlA=="/>
     </p:ext>
   </p:extLst>
 </p:presentation>
@@ -22620,8 +22620,8 @@
         </p:nvSpPr>
         <p:spPr>
           <a:xfrm>
-            <a:off x="3386138" y="4683125"/>
-            <a:ext cx="6235534" cy="461665"/>
+            <a:off x="419725" y="4683125"/>
+            <a:ext cx="11602386" cy="461665"/>
           </a:xfrm>
           <a:prstGeom prst="rect">
             <a:avLst/>
@@ -22655,18 +22655,65 @@
               <a:buNone/>
             </a:pPr>
             <a:r>
-              <a:rPr lang="pt-BR" sz="2400" b="1" i="0" u="none" strike="noStrike" cap="none">
-                <a:solidFill>
-                  <a:schemeClr val="dk1"/>
+              <a:rPr lang="pt-BR" sz="2400" b="1" dirty="0">
+                <a:solidFill>
+                  <a:srgbClr val="0070C0"/>
                 </a:solidFill>
                 <a:latin typeface="Century Schoolbook"/>
-                <a:ea typeface="Century Schoolbook"/>
-                <a:cs typeface="Century Schoolbook"/>
                 <a:sym typeface="Century Schoolbook"/>
               </a:rPr>
-              <a:t>Talita Rocha Pinheiro</a:t>
+              <a:t>Professor </a:t>
             </a:r>
-            <a:endParaRPr sz="1400" b="0" i="0" u="none" strike="noStrike" cap="none">
+            <a:r>
+              <a:rPr lang="pt-BR" sz="2400" b="1" dirty="0" err="1">
+                <a:solidFill>
+                  <a:srgbClr val="0070C0"/>
+                </a:solidFill>
+                <a:latin typeface="Century Schoolbook"/>
+                <a:sym typeface="Century Schoolbook"/>
+              </a:rPr>
+              <a:t>MSc</a:t>
+            </a:r>
+            <a:r>
+              <a:rPr lang="pt-BR" sz="2400" b="1" dirty="0">
+                <a:solidFill>
+                  <a:srgbClr val="0070C0"/>
+                </a:solidFill>
+                <a:latin typeface="Century Schoolbook"/>
+                <a:sym typeface="Century Schoolbook"/>
+              </a:rPr>
+              <a:t> Heleno Cardoso </a:t>
+            </a:r>
+            <a:r>
+              <a:rPr lang="pt-BR" sz="2400" b="1" dirty="0">
+                <a:solidFill>
+                  <a:schemeClr val="dk1"/>
+                </a:solidFill>
+                <a:latin typeface="Century Schoolbook"/>
+                <a:sym typeface="Century Schoolbook"/>
+              </a:rPr>
+              <a:t>– E-mail: helenocardosofilho@gmail.com</a:t>
+            </a:r>
+          </a:p>
+          <a:p>
+            <a:pPr marL="0" marR="0" lvl="0" indent="0" algn="ctr" rtl="0">
+              <a:lnSpc>
+                <a:spcPct val="100000"/>
+              </a:lnSpc>
+              <a:spcBef>
+                <a:spcPts val="0"/>
+              </a:spcBef>
+              <a:spcAft>
+                <a:spcPts val="0"/>
+              </a:spcAft>
+              <a:buClr>
+                <a:srgbClr val="000000"/>
+              </a:buClr>
+              <a:buSzPts val="2400"/>
+              <a:buFont typeface="Arial"/>
+              <a:buNone/>
+            </a:pPr>
+            <a:endParaRPr sz="1400" b="0" i="0" u="none" strike="noStrike" cap="none" dirty="0">
               <a:solidFill>
                 <a:srgbClr val="000000"/>
               </a:solidFill>
@@ -22721,7 +22768,7 @@
               <a:buNone/>
             </a:pPr>
             <a:r>
-              <a:rPr lang="pt-BR" sz="3600" b="1" i="0" u="none" strike="noStrike" cap="none">
+              <a:rPr lang="pt-BR" sz="3600" b="1" i="0" u="none" strike="noStrike" cap="none" dirty="0">
                 <a:solidFill>
                   <a:schemeClr val="dk1"/>
                 </a:solidFill>
@@ -22732,7 +22779,7 @@
               </a:rPr>
               <a:t>Banco de Dados</a:t>
             </a:r>
-            <a:endParaRPr sz="1400" b="0" i="0" u="none" strike="noStrike" cap="none">
+            <a:endParaRPr sz="1400" b="0" i="0" u="none" strike="noStrike" cap="none" dirty="0">
               <a:solidFill>
                 <a:srgbClr val="000000"/>
               </a:solidFill>
@@ -22761,7 +22808,7 @@
               <a:buNone/>
             </a:pPr>
             <a:r>
-              <a:rPr lang="pt-BR" sz="3600" b="1" i="0" u="none" strike="noStrike" cap="none">
+              <a:rPr lang="pt-BR" sz="3600" b="1" i="0" u="none" strike="noStrike" cap="none" dirty="0">
                 <a:solidFill>
                   <a:schemeClr val="dk1"/>
                 </a:solidFill>
@@ -22839,6 +22886,90 @@
           </a:ln>
         </p:spPr>
       </p:pic>
+      <p:sp>
+        <p:nvSpPr>
+          <p:cNvPr id="2" name="Google Shape;89;p1">
+            <a:extLst>
+              <a:ext uri="{FF2B5EF4-FFF2-40B4-BE49-F238E27FC236}">
+                <a16:creationId xmlns:a16="http://schemas.microsoft.com/office/drawing/2014/main" id="{318B88EC-7B3D-BF5A-E121-A2B2962CB683}"/>
+              </a:ext>
+            </a:extLst>
+          </p:cNvPr>
+          <p:cNvSpPr/>
+          <p:nvPr/>
+        </p:nvSpPr>
+        <p:spPr>
+          <a:xfrm>
+            <a:off x="1274164" y="5432931"/>
+            <a:ext cx="8347508" cy="461665"/>
+          </a:xfrm>
+          <a:prstGeom prst="rect">
+            <a:avLst/>
+          </a:prstGeom>
+          <a:noFill/>
+          <a:ln>
+            <a:noFill/>
+          </a:ln>
+        </p:spPr>
+        <p:txBody>
+          <a:bodyPr spcFirstLastPara="1" wrap="square" lIns="91425" tIns="45700" rIns="91425" bIns="45700" anchor="t" anchorCtr="0">
+            <a:noAutofit/>
+          </a:bodyPr>
+          <a:lstStyle/>
+          <a:p>
+            <a:pPr marL="0" marR="0" lvl="0" indent="0" algn="ctr" rtl="0">
+              <a:lnSpc>
+                <a:spcPct val="100000"/>
+              </a:lnSpc>
+              <a:spcBef>
+                <a:spcPts val="0"/>
+              </a:spcBef>
+              <a:spcAft>
+                <a:spcPts val="0"/>
+              </a:spcAft>
+              <a:buClr>
+                <a:srgbClr val="000000"/>
+              </a:buClr>
+              <a:buSzPts val="2400"/>
+              <a:buFont typeface="Arial"/>
+              <a:buNone/>
+            </a:pPr>
+            <a:r>
+              <a:rPr lang="pt-BR" sz="2400" b="1" i="0" u="none" strike="noStrike" cap="none" dirty="0">
+                <a:solidFill>
+                  <a:srgbClr val="FF0000"/>
+                </a:solidFill>
+                <a:latin typeface="Century Schoolbook"/>
+                <a:ea typeface="Century Schoolbook"/>
+                <a:cs typeface="Century Schoolbook"/>
+                <a:sym typeface="Century Schoolbook"/>
+              </a:rPr>
+              <a:t>Agradecimentos</a:t>
+            </a:r>
+            <a:r>
+              <a:rPr lang="pt-BR" sz="2400" b="1" i="0" u="none" strike="noStrike" cap="none" dirty="0">
+                <a:solidFill>
+                  <a:schemeClr val="dk1"/>
+                </a:solidFill>
+                <a:latin typeface="Century Schoolbook"/>
+                <a:ea typeface="Century Schoolbook"/>
+                <a:cs typeface="Century Schoolbook"/>
+                <a:sym typeface="Century Schoolbook"/>
+              </a:rPr>
+              <a:t>: Professora Talita Rocha Pinheiro</a:t>
+            </a:r>
+            <a:endParaRPr sz="1400" b="0" i="0" u="none" strike="noStrike" cap="none" dirty="0">
+              <a:solidFill>
+                <a:srgbClr val="000000"/>
+              </a:solidFill>
+              <a:latin typeface="Arial"/>
+              <a:ea typeface="Arial"/>
+              <a:cs typeface="Arial"/>
+              <a:sym typeface="Arial"/>
+            </a:endParaRPr>
+          </a:p>
+        </p:txBody>
+      </p:sp>
     </p:spTree>
   </p:cSld>
   <p:clrMapOvr>

</xml_diff>